<commit_message>
ensuring everything is committed
</commit_message>
<xml_diff>
--- a/Subreddit_Presentation.pptx
+++ b/Subreddit_Presentation.pptx
@@ -232,7 +232,7 @@
           <a:p>
             <a:fld id="{EF1077DB-935E-4A0A-947A-D283B9F9F452}" type="datetimeFigureOut">
               <a:rPr lang="en-US" smtClean="0"/>
-              <a:t>7/12/19</a:t>
+              <a:t>7/13/19</a:t>
             </a:fld>
             <a:endParaRPr lang="en-US"/>
           </a:p>
@@ -409,7 +409,7 @@
           <a:p>
             <a:fld id="{2D9EC30E-1A71-4188-9BE7-E2A64929A436}" type="datetimeFigureOut">
               <a:rPr lang="en-US" noProof="0" smtClean="0"/>
-              <a:t>7/12/19</a:t>
+              <a:t>7/13/19</a:t>
             </a:fld>
             <a:endParaRPr lang="en-US" noProof="0"/>
           </a:p>
@@ -23124,15 +23124,7 @@
             </a:r>
             <a:r>
               <a:rPr lang="en-US" dirty="0"/>
-              <a:t> </a:t>
-            </a:r>
-            <a:r>
-              <a:rPr lang="en-US"/>
-              <a:t>&amp; NLP </a:t>
-            </a:r>
-            <a:r>
-              <a:rPr lang="en-US" dirty="0"/>
-              <a:t>Methods: California vs. Texas Politics</a:t>
+              <a:t> &amp; NLP Methods: California vs. Texas Politics</a:t>
             </a:r>
           </a:p>
         </p:txBody>
@@ -32566,7 +32558,7 @@
             </a:pPr>
             <a:r>
               <a:rPr lang="en-US" sz="2800" dirty="0"/>
-              <a:t> Scrapped Data From 2 Subreddits</a:t>
+              <a:t> Scraped Data From 2 Subreddits</a:t>
             </a:r>
           </a:p>
           <a:p>
@@ -32605,7 +32597,7 @@
             </a:pPr>
             <a:r>
               <a:rPr lang="en-US" sz="2800" dirty="0"/>
-              <a:t> Scrapped the 1000 most recent posts</a:t>
+              <a:t> Scraped the 1000 most recent posts</a:t>
             </a:r>
           </a:p>
           <a:p>
@@ -35882,15 +35874,7 @@
             </a:pPr>
             <a:r>
               <a:rPr lang="en-US" dirty="0"/>
-              <a:t>So we scored the corpus with and without them as </a:t>
-            </a:r>
-            <a:r>
-              <a:rPr lang="en-US" dirty="0" err="1"/>
-              <a:t>stopwords</a:t>
-            </a:r>
-            <a:r>
-              <a:rPr lang="en-US" dirty="0"/>
-              <a:t>.</a:t>
+              <a:t>So we scored the corpus with and without them as stop words.</a:t>
             </a:r>
           </a:p>
           <a:p>
@@ -39504,15 +39488,7 @@
             </a:pPr>
             <a:r>
               <a:rPr lang="en-US" dirty="0"/>
-              <a:t>Classification Models :: Logistic </a:t>
-            </a:r>
-            <a:r>
-              <a:rPr lang="en-US" dirty="0" err="1"/>
-              <a:t>Regresstion</a:t>
-            </a:r>
-            <a:r>
-              <a:rPr lang="en-US" dirty="0"/>
-              <a:t>, Multinomial Naive-Bayes Classifier, Random Forest Classifier, </a:t>
+              <a:t>Classification Models :: Logistic Regression, Multinomial Naive-Bayes Classifier, Random Forest Classifier, </a:t>
             </a:r>
             <a:r>
               <a:rPr lang="en-US" dirty="0" err="1"/>
@@ -40783,20 +40759,20 @@
 </file>
 
 <file path=customXml/item1.xml><?xml version="1.0" encoding="utf-8"?>
-<p:properties xmlns:p="http://schemas.microsoft.com/office/2006/metadata/properties" xmlns:xsi="http://www.w3.org/2001/XMLSchema-instance" xmlns:pc="http://schemas.microsoft.com/office/infopath/2007/PartnerControls">
-  <documentManagement>
-    <MediaServiceKeyPoints xmlns="71af3243-3dd4-4a8d-8c0d-dd76da1f02a5" xsi:nil="true"/>
-  </documentManagement>
-</p:properties>
-</file>
-
-<file path=customXml/item2.xml><?xml version="1.0" encoding="utf-8"?>
 <?mso-contentType ?>
 <FormTemplates xmlns="http://schemas.microsoft.com/sharepoint/v3/contenttype/forms">
   <Display>DocumentLibraryForm</Display>
   <Edit>DocumentLibraryForm</Edit>
   <New>DocumentLibraryForm</New>
 </FormTemplates>
+</file>
+
+<file path=customXml/item2.xml><?xml version="1.0" encoding="utf-8"?>
+<p:properties xmlns:p="http://schemas.microsoft.com/office/2006/metadata/properties" xmlns:xsi="http://www.w3.org/2001/XMLSchema-instance" xmlns:pc="http://schemas.microsoft.com/office/infopath/2007/PartnerControls">
+  <documentManagement>
+    <MediaServiceKeyPoints xmlns="71af3243-3dd4-4a8d-8c0d-dd76da1f02a5" xsi:nil="true"/>
+  </documentManagement>
+</p:properties>
 </file>
 
 <file path=customXml/item3.xml><?xml version="1.0" encoding="utf-8"?>
@@ -41011,19 +40987,19 @@
 </file>
 
 <file path=customXml/itemProps1.xml><?xml version="1.0" encoding="utf-8"?>
+<ds:datastoreItem xmlns:ds="http://schemas.openxmlformats.org/officeDocument/2006/customXml" ds:itemID="{8A930687-51F2-44C8-9CE6-D1B3D6E17522}">
+  <ds:schemaRefs>
+    <ds:schemaRef ds:uri="http://schemas.microsoft.com/sharepoint/v3/contenttype/forms"/>
+  </ds:schemaRefs>
+</ds:datastoreItem>
+</file>
+
+<file path=customXml/itemProps2.xml><?xml version="1.0" encoding="utf-8"?>
 <ds:datastoreItem xmlns:ds="http://schemas.openxmlformats.org/officeDocument/2006/customXml" ds:itemID="{A861FE8A-8F15-409F-AF62-619C69C0D537}">
   <ds:schemaRefs>
     <ds:schemaRef ds:uri="http://schemas.microsoft.com/office/2006/metadata/properties"/>
     <ds:schemaRef ds:uri="http://schemas.microsoft.com/office/infopath/2007/PartnerControls"/>
     <ds:schemaRef ds:uri="71af3243-3dd4-4a8d-8c0d-dd76da1f02a5"/>
-  </ds:schemaRefs>
-</ds:datastoreItem>
-</file>
-
-<file path=customXml/itemProps2.xml><?xml version="1.0" encoding="utf-8"?>
-<ds:datastoreItem xmlns:ds="http://schemas.openxmlformats.org/officeDocument/2006/customXml" ds:itemID="{8A930687-51F2-44C8-9CE6-D1B3D6E17522}">
-  <ds:schemaRefs>
-    <ds:schemaRef ds:uri="http://schemas.microsoft.com/sharepoint/v3/contenttype/forms"/>
   </ds:schemaRefs>
 </ds:datastoreItem>
 </file>

</xml_diff>